<commit_message>
Second part of logging and monitoring slides
</commit_message>
<xml_diff>
--- a/08-Logging-Monitoring/08-Logging-Monitoring.pptx
+++ b/08-Logging-Monitoring/08-Logging-Monitoring.pptx
@@ -5,7 +5,7 @@
     <p:sldMasterId id="2147483672" r:id="rId1"/>
   </p:sldMasterIdLst>
   <p:notesMasterIdLst>
-    <p:notesMasterId r:id="rId15"/>
+    <p:notesMasterId r:id="rId19"/>
   </p:notesMasterIdLst>
   <p:sldIdLst>
     <p:sldId id="256" r:id="rId2"/>
@@ -21,6 +21,10 @@
     <p:sldId id="266" r:id="rId12"/>
     <p:sldId id="267" r:id="rId13"/>
     <p:sldId id="268" r:id="rId14"/>
+    <p:sldId id="270" r:id="rId15"/>
+    <p:sldId id="271" r:id="rId16"/>
+    <p:sldId id="269" r:id="rId17"/>
+    <p:sldId id="272" r:id="rId18"/>
   </p:sldIdLst>
   <p:sldSz cx="9144000" cy="6858000" type="screen4x3"/>
   <p:notesSz cx="6858000" cy="9144000"/>
@@ -145,6 +149,10 @@
         <p14:section name="Logging" id="{F5907254-A3DB-4C21-A2D8-F52DB280ACBF}">
           <p14:sldIdLst>
             <p14:sldId id="268"/>
+            <p14:sldId id="270"/>
+            <p14:sldId id="271"/>
+            <p14:sldId id="269"/>
+            <p14:sldId id="272"/>
           </p14:sldIdLst>
         </p14:section>
       </p14:sectionLst>
@@ -242,7 +250,7 @@
           <a:p>
             <a:fld id="{852105B6-D441-4EC0-9FA7-CF26CD0B8EA0}" type="datetimeFigureOut">
               <a:rPr lang="en-US" smtClean="0"/>
-              <a:t>12/13/2017</a:t>
+              <a:t>12/14/2017</a:t>
             </a:fld>
             <a:endParaRPr lang="en-US"/>
           </a:p>
@@ -3224,7 +3232,45 @@
           <a:bodyPr/>
           <a:lstStyle/>
           <a:p>
-            <a:endParaRPr lang="en-US"/>
+            <a:r>
+              <a:rPr lang="en-US" dirty="0"/>
+              <a:t>Synthetic monitoring is about </a:t>
+            </a:r>
+            <a:r>
+              <a:rPr lang="en-US" i="1" dirty="0"/>
+              <a:t>is the system working</a:t>
+            </a:r>
+          </a:p>
+          <a:p>
+            <a:r>
+              <a:rPr lang="en-US" dirty="0"/>
+              <a:t>The advantage of synthetic monitoring is that it tests the whole system at once by executing regular tasks a regular users also executes</a:t>
+            </a:r>
+          </a:p>
+          <a:p>
+            <a:r>
+              <a:rPr lang="en-US" dirty="0"/>
+              <a:t>This sounds a lot like behavior driven development and E2E tests, doesn’t it?</a:t>
+            </a:r>
+            <a:br>
+              <a:rPr lang="en-US" dirty="0"/>
+            </a:br>
+            <a:r>
+              <a:rPr lang="en-US" dirty="0"/>
+              <a:t>Well, if it sounds like a duck, and smells like a duck and behaves like a duck…it is a duck! Actually you could re-use (more or less) your already existing E2E tests (you implemented E2E tests, right?) for synthetic monitoring!</a:t>
+            </a:r>
+          </a:p>
+          <a:p>
+            <a:r>
+              <a:rPr lang="en-US" dirty="0"/>
+              <a:t>When it comes to implementing synthetic monitoring and you want to re-use your E2E tests you have to pay attention that you don’t trigger any side-effects by manipulating real user accounts, orders or anything else.</a:t>
+            </a:r>
+          </a:p>
+          <a:p>
+            <a:r>
+              <a:rPr lang="en-US" dirty="0"/>
+              <a:t>To avoid these side effects you could have test accounts, data, … in your production environment. This way you also have a discrete set of data you know when you implement the tests. This is also helpful when it comes to response validation.</a:t>
+            </a:r>
           </a:p>
         </p:txBody>
       </p:sp>
@@ -3286,12 +3332,102 @@
           </a:p>
         </p:txBody>
       </p:sp>
+      <p:pic>
+        <p:nvPicPr>
+          <p:cNvPr id="2" name="Inhaltsplatzhalter 1">
+            <a:extLst>
+              <a:ext uri="{FF2B5EF4-FFF2-40B4-BE49-F238E27FC236}">
+                <a16:creationId xmlns:a16="http://schemas.microsoft.com/office/drawing/2014/main" id="{E18EC661-D9EE-4723-8A07-AE2AEAA41B66}"/>
+              </a:ext>
+            </a:extLst>
+          </p:cNvPr>
+          <p:cNvPicPr>
+            <a:picLocks noGrp="1" noChangeAspect="1"/>
+          </p:cNvPicPr>
+          <p:nvPr>
+            <p:ph idx="1"/>
+          </p:nvPr>
+        </p:nvPicPr>
+        <p:blipFill>
+          <a:blip r:embed="rId2"/>
+          <a:stretch>
+            <a:fillRect/>
+          </a:stretch>
+        </p:blipFill>
+        <p:spPr>
+          <a:xfrm>
+            <a:off x="1581957" y="1340528"/>
+            <a:ext cx="6051524" cy="4972282"/>
+          </a:xfrm>
+          <a:prstGeom prst="rect">
+            <a:avLst/>
+          </a:prstGeom>
+        </p:spPr>
+      </p:pic>
+    </p:spTree>
+    <p:extLst>
+      <p:ext uri="{BB962C8B-B14F-4D97-AF65-F5344CB8AC3E}">
+        <p14:creationId xmlns:p14="http://schemas.microsoft.com/office/powerpoint/2010/main" val="583187769"/>
+      </p:ext>
+    </p:extLst>
+  </p:cSld>
+  <p:clrMapOvr>
+    <a:masterClrMapping/>
+  </p:clrMapOvr>
+</p:sld>
+</file>
+
+<file path=ppt/slides/slide14.xml><?xml version="1.0" encoding="utf-8"?>
+<p:sld xmlns:a="http://schemas.openxmlformats.org/drawingml/2006/main" xmlns:r="http://schemas.openxmlformats.org/officeDocument/2006/relationships" xmlns:p="http://schemas.openxmlformats.org/presentationml/2006/main">
+  <p:cSld>
+    <p:spTree>
+      <p:nvGrpSpPr>
+        <p:cNvPr id="1" name=""/>
+        <p:cNvGrpSpPr/>
+        <p:nvPr/>
+      </p:nvGrpSpPr>
+      <p:grpSpPr>
+        <a:xfrm>
+          <a:off x="0" y="0"/>
+          <a:ext cx="0" cy="0"/>
+          <a:chOff x="0" y="0"/>
+          <a:chExt cx="0" cy="0"/>
+        </a:xfrm>
+      </p:grpSpPr>
+      <p:sp>
+        <p:nvSpPr>
+          <p:cNvPr id="4" name="Titel 3">
+            <a:extLst>
+              <a:ext uri="{FF2B5EF4-FFF2-40B4-BE49-F238E27FC236}">
+                <a16:creationId xmlns:a16="http://schemas.microsoft.com/office/drawing/2014/main" id="{237AA3C4-088B-4437-A90F-59625585A6E2}"/>
+              </a:ext>
+            </a:extLst>
+          </p:cNvPr>
+          <p:cNvSpPr>
+            <a:spLocks noGrp="1"/>
+          </p:cNvSpPr>
+          <p:nvPr>
+            <p:ph type="title"/>
+          </p:nvPr>
+        </p:nvSpPr>
+        <p:spPr/>
+        <p:txBody>
+          <a:bodyPr/>
+          <a:lstStyle/>
+          <a:p>
+            <a:r>
+              <a:rPr lang="en-US" dirty="0"/>
+              <a:t>Correlation IDs</a:t>
+            </a:r>
+          </a:p>
+        </p:txBody>
+      </p:sp>
       <p:sp>
         <p:nvSpPr>
           <p:cNvPr id="5" name="Inhaltsplatzhalter 4">
             <a:extLst>
               <a:ext uri="{FF2B5EF4-FFF2-40B4-BE49-F238E27FC236}">
-                <a16:creationId xmlns:a16="http://schemas.microsoft.com/office/drawing/2014/main" id="{9670A4B0-1993-4173-B06D-EE5191C7D985}"/>
+                <a16:creationId xmlns:a16="http://schemas.microsoft.com/office/drawing/2014/main" id="{66AC902C-9473-4D0A-8014-310B0A6155A9}"/>
               </a:ext>
             </a:extLst>
           </p:cNvPr>
@@ -3307,14 +3443,339 @@
           <a:bodyPr/>
           <a:lstStyle/>
           <a:p>
-            <a:endParaRPr lang="en-US"/>
+            <a:r>
+              <a:rPr lang="en-US" dirty="0"/>
+              <a:t>From the moment when you have more than one service in your microservice application it might be the case that an interaction of a user might result in a cascade of events in multiple services (even if you avoided direct coupling)</a:t>
+            </a:r>
+          </a:p>
+          <a:p>
+            <a:r>
+              <a:rPr lang="en-US" dirty="0"/>
+              <a:t>When it comes to an error and you have to analyze how this error occurred you have to dig through your logs and trace the request from the beginning to the error site (think of a distributed stack trace)</a:t>
+            </a:r>
+          </a:p>
+          <a:p>
+            <a:r>
+              <a:rPr lang="en-US" dirty="0"/>
+              <a:t>If you don’t have any indicator which entries belong to the initial request you have to analyze all logs of a certain timespan and </a:t>
+            </a:r>
+            <a:r>
+              <a:rPr lang="en-US" i="1" dirty="0"/>
+              <a:t>guess</a:t>
+            </a:r>
+            <a:r>
+              <a:rPr lang="en-US" dirty="0"/>
+              <a:t> which entries are belonging together</a:t>
+            </a:r>
           </a:p>
         </p:txBody>
       </p:sp>
     </p:spTree>
     <p:extLst>
       <p:ext uri="{BB962C8B-B14F-4D97-AF65-F5344CB8AC3E}">
-        <p14:creationId xmlns:p14="http://schemas.microsoft.com/office/powerpoint/2010/main" val="583187769"/>
+        <p14:creationId xmlns:p14="http://schemas.microsoft.com/office/powerpoint/2010/main" val="1666278964"/>
+      </p:ext>
+    </p:extLst>
+  </p:cSld>
+  <p:clrMapOvr>
+    <a:masterClrMapping/>
+  </p:clrMapOvr>
+</p:sld>
+</file>
+
+<file path=ppt/slides/slide15.xml><?xml version="1.0" encoding="utf-8"?>
+<p:sld xmlns:a="http://schemas.openxmlformats.org/drawingml/2006/main" xmlns:r="http://schemas.openxmlformats.org/officeDocument/2006/relationships" xmlns:p="http://schemas.openxmlformats.org/presentationml/2006/main">
+  <p:cSld>
+    <p:spTree>
+      <p:nvGrpSpPr>
+        <p:cNvPr id="1" name=""/>
+        <p:cNvGrpSpPr/>
+        <p:nvPr/>
+      </p:nvGrpSpPr>
+      <p:grpSpPr>
+        <a:xfrm>
+          <a:off x="0" y="0"/>
+          <a:ext cx="0" cy="0"/>
+          <a:chOff x="0" y="0"/>
+          <a:chExt cx="0" cy="0"/>
+        </a:xfrm>
+      </p:grpSpPr>
+      <p:sp>
+        <p:nvSpPr>
+          <p:cNvPr id="4" name="Titel 3">
+            <a:extLst>
+              <a:ext uri="{FF2B5EF4-FFF2-40B4-BE49-F238E27FC236}">
+                <a16:creationId xmlns:a16="http://schemas.microsoft.com/office/drawing/2014/main" id="{D6AE0BC2-7D2C-467B-8F9D-44D494D41391}"/>
+              </a:ext>
+            </a:extLst>
+          </p:cNvPr>
+          <p:cNvSpPr>
+            <a:spLocks noGrp="1"/>
+          </p:cNvSpPr>
+          <p:nvPr>
+            <p:ph type="title"/>
+          </p:nvPr>
+        </p:nvSpPr>
+        <p:spPr/>
+        <p:txBody>
+          <a:bodyPr/>
+          <a:lstStyle/>
+          <a:p>
+            <a:r>
+              <a:rPr lang="en-US" dirty="0"/>
+              <a:t>Correlation IDs</a:t>
+            </a:r>
+          </a:p>
+        </p:txBody>
+      </p:sp>
+      <p:pic>
+        <p:nvPicPr>
+          <p:cNvPr id="7" name="Inhaltsplatzhalter 6" descr="Ein Bild, das Text enthält.&#10;&#10;Mit sehr hoher Zuverlässigkeit generierte Beschreibung">
+            <a:extLst>
+              <a:ext uri="{FF2B5EF4-FFF2-40B4-BE49-F238E27FC236}">
+                <a16:creationId xmlns:a16="http://schemas.microsoft.com/office/drawing/2014/main" id="{EA12795B-B061-414E-814E-3A07D4EE8ECE}"/>
+              </a:ext>
+            </a:extLst>
+          </p:cNvPr>
+          <p:cNvPicPr>
+            <a:picLocks noGrp="1" noChangeAspect="1"/>
+          </p:cNvPicPr>
+          <p:nvPr>
+            <p:ph idx="1"/>
+          </p:nvPr>
+        </p:nvPicPr>
+        <p:blipFill>
+          <a:blip r:embed="rId2"/>
+          <a:stretch>
+            <a:fillRect/>
+          </a:stretch>
+        </p:blipFill>
+        <p:spPr>
+          <a:xfrm>
+            <a:off x="2226469" y="2135981"/>
+            <a:ext cx="4762500" cy="3381375"/>
+          </a:xfrm>
+        </p:spPr>
+      </p:pic>
+    </p:spTree>
+    <p:extLst>
+      <p:ext uri="{BB962C8B-B14F-4D97-AF65-F5344CB8AC3E}">
+        <p14:creationId xmlns:p14="http://schemas.microsoft.com/office/powerpoint/2010/main" val="1036605657"/>
+      </p:ext>
+    </p:extLst>
+  </p:cSld>
+  <p:clrMapOvr>
+    <a:masterClrMapping/>
+  </p:clrMapOvr>
+</p:sld>
+</file>
+
+<file path=ppt/slides/slide16.xml><?xml version="1.0" encoding="utf-8"?>
+<p:sld xmlns:a="http://schemas.openxmlformats.org/drawingml/2006/main" xmlns:r="http://schemas.openxmlformats.org/officeDocument/2006/relationships" xmlns:p="http://schemas.openxmlformats.org/presentationml/2006/main">
+  <p:cSld>
+    <p:spTree>
+      <p:nvGrpSpPr>
+        <p:cNvPr id="1" name=""/>
+        <p:cNvGrpSpPr/>
+        <p:nvPr/>
+      </p:nvGrpSpPr>
+      <p:grpSpPr>
+        <a:xfrm>
+          <a:off x="0" y="0"/>
+          <a:ext cx="0" cy="0"/>
+          <a:chOff x="0" y="0"/>
+          <a:chExt cx="0" cy="0"/>
+        </a:xfrm>
+      </p:grpSpPr>
+      <p:sp>
+        <p:nvSpPr>
+          <p:cNvPr id="4" name="Titel 3">
+            <a:extLst>
+              <a:ext uri="{FF2B5EF4-FFF2-40B4-BE49-F238E27FC236}">
+                <a16:creationId xmlns:a16="http://schemas.microsoft.com/office/drawing/2014/main" id="{6F41F336-59A5-4EDE-B285-BB0998F8EA69}"/>
+              </a:ext>
+            </a:extLst>
+          </p:cNvPr>
+          <p:cNvSpPr>
+            <a:spLocks noGrp="1"/>
+          </p:cNvSpPr>
+          <p:nvPr>
+            <p:ph type="title"/>
+          </p:nvPr>
+        </p:nvSpPr>
+        <p:spPr/>
+        <p:txBody>
+          <a:bodyPr/>
+          <a:lstStyle/>
+          <a:p>
+            <a:r>
+              <a:rPr lang="en-US" dirty="0"/>
+              <a:t>Correlation IDs</a:t>
+            </a:r>
+          </a:p>
+        </p:txBody>
+      </p:sp>
+      <p:pic>
+        <p:nvPicPr>
+          <p:cNvPr id="6" name="Inhaltsplatzhalter 5">
+            <a:extLst>
+              <a:ext uri="{FF2B5EF4-FFF2-40B4-BE49-F238E27FC236}">
+                <a16:creationId xmlns:a16="http://schemas.microsoft.com/office/drawing/2014/main" id="{4232FEA4-3C02-4E97-965B-EC8E8D482799}"/>
+              </a:ext>
+            </a:extLst>
+          </p:cNvPr>
+          <p:cNvPicPr>
+            <a:picLocks noGrp="1" noChangeAspect="1"/>
+          </p:cNvPicPr>
+          <p:nvPr>
+            <p:ph idx="1"/>
+          </p:nvPr>
+        </p:nvPicPr>
+        <p:blipFill>
+          <a:blip r:embed="rId2"/>
+          <a:stretch>
+            <a:fillRect/>
+          </a:stretch>
+        </p:blipFill>
+        <p:spPr>
+          <a:xfrm>
+            <a:off x="1615737" y="1368284"/>
+            <a:ext cx="5983964" cy="4916770"/>
+          </a:xfrm>
+          <a:prstGeom prst="rect">
+            <a:avLst/>
+          </a:prstGeom>
+        </p:spPr>
+      </p:pic>
+    </p:spTree>
+    <p:extLst>
+      <p:ext uri="{BB962C8B-B14F-4D97-AF65-F5344CB8AC3E}">
+        <p14:creationId xmlns:p14="http://schemas.microsoft.com/office/powerpoint/2010/main" val="3441945900"/>
+      </p:ext>
+    </p:extLst>
+  </p:cSld>
+  <p:clrMapOvr>
+    <a:masterClrMapping/>
+  </p:clrMapOvr>
+</p:sld>
+</file>
+
+<file path=ppt/slides/slide17.xml><?xml version="1.0" encoding="utf-8"?>
+<p:sld xmlns:a="http://schemas.openxmlformats.org/drawingml/2006/main" xmlns:r="http://schemas.openxmlformats.org/officeDocument/2006/relationships" xmlns:p="http://schemas.openxmlformats.org/presentationml/2006/main">
+  <p:cSld>
+    <p:spTree>
+      <p:nvGrpSpPr>
+        <p:cNvPr id="1" name=""/>
+        <p:cNvGrpSpPr/>
+        <p:nvPr/>
+      </p:nvGrpSpPr>
+      <p:grpSpPr>
+        <a:xfrm>
+          <a:off x="0" y="0"/>
+          <a:ext cx="0" cy="0"/>
+          <a:chOff x="0" y="0"/>
+          <a:chExt cx="0" cy="0"/>
+        </a:xfrm>
+      </p:grpSpPr>
+      <p:sp>
+        <p:nvSpPr>
+          <p:cNvPr id="4" name="Titel 3">
+            <a:extLst>
+              <a:ext uri="{FF2B5EF4-FFF2-40B4-BE49-F238E27FC236}">
+                <a16:creationId xmlns:a16="http://schemas.microsoft.com/office/drawing/2014/main" id="{32F763DB-5E68-428B-A2A1-E45665D8AE1E}"/>
+              </a:ext>
+            </a:extLst>
+          </p:cNvPr>
+          <p:cNvSpPr>
+            <a:spLocks noGrp="1"/>
+          </p:cNvSpPr>
+          <p:nvPr>
+            <p:ph type="title"/>
+          </p:nvPr>
+        </p:nvSpPr>
+        <p:spPr/>
+        <p:txBody>
+          <a:bodyPr/>
+          <a:lstStyle/>
+          <a:p>
+            <a:r>
+              <a:rPr lang="en-US" dirty="0"/>
+              <a:t>Correlation IDs</a:t>
+            </a:r>
+          </a:p>
+        </p:txBody>
+      </p:sp>
+      <p:sp>
+        <p:nvSpPr>
+          <p:cNvPr id="5" name="Inhaltsplatzhalter 4">
+            <a:extLst>
+              <a:ext uri="{FF2B5EF4-FFF2-40B4-BE49-F238E27FC236}">
+                <a16:creationId xmlns:a16="http://schemas.microsoft.com/office/drawing/2014/main" id="{A65B004C-8940-4417-AF78-7A474BA9FA76}"/>
+              </a:ext>
+            </a:extLst>
+          </p:cNvPr>
+          <p:cNvSpPr>
+            <a:spLocks noGrp="1"/>
+          </p:cNvSpPr>
+          <p:nvPr>
+            <p:ph idx="1"/>
+          </p:nvPr>
+        </p:nvSpPr>
+        <p:spPr/>
+        <p:txBody>
+          <a:bodyPr/>
+          <a:lstStyle/>
+          <a:p>
+            <a:r>
+              <a:rPr lang="en-US" dirty="0"/>
+              <a:t>A correlation id helps to aggregate logs belonging together</a:t>
+            </a:r>
+          </a:p>
+          <a:p>
+            <a:r>
+              <a:rPr lang="en-US" dirty="0"/>
+              <a:t>Whenever a service triggers an action of another service (directly or indirectly e.g. by enqueuing a message to a bus) it has to include the correlation id</a:t>
+            </a:r>
+          </a:p>
+          <a:p>
+            <a:r>
+              <a:rPr lang="en-US" dirty="0"/>
+              <a:t>Tools like Kong are providing plugins or mechanisms to add correlation ids</a:t>
+            </a:r>
+          </a:p>
+          <a:p>
+            <a:r>
+              <a:rPr lang="en-US" dirty="0"/>
+              <a:t>To avoid that a team mate forgets to include the correlation id it might be a good idea to handle the inclusion in a middleware component, a custom HTTP client wrapper, a custom event bus wrapper,…</a:t>
+            </a:r>
+          </a:p>
+          <a:p>
+            <a:r>
+              <a:rPr lang="en-US" dirty="0"/>
+              <a:t>Tools like </a:t>
+            </a:r>
+            <a:r>
+              <a:rPr lang="en-US" dirty="0" err="1">
+                <a:hlinkClick r:id="rId2"/>
+              </a:rPr>
+              <a:t>ZipKin</a:t>
+            </a:r>
+            <a:r>
+              <a:rPr lang="en-US" dirty="0"/>
+              <a:t> help to trace requests in distributed systems (but </a:t>
+            </a:r>
+            <a:r>
+              <a:rPr lang="en-US"/>
+              <a:t>with extra costs!)</a:t>
+            </a:r>
+            <a:endParaRPr lang="en-US" dirty="0"/>
+          </a:p>
+        </p:txBody>
+      </p:sp>
+    </p:spTree>
+    <p:extLst>
+      <p:ext uri="{BB962C8B-B14F-4D97-AF65-F5344CB8AC3E}">
+        <p14:creationId xmlns:p14="http://schemas.microsoft.com/office/powerpoint/2010/main" val="943193221"/>
       </p:ext>
     </p:extLst>
   </p:cSld>

</xml_diff>